<commit_message>
blog gpt backend ppt
</commit_message>
<xml_diff>
--- a/pptgpt.pptx
+++ b/pptgpt.pptx
@@ -9,7 +9,6 @@
     <p:sldId id="257" r:id="rId8"/>
     <p:sldId id="258" r:id="rId9"/>
     <p:sldId id="259" r:id="rId10"/>
-    <p:sldId id="260" r:id="rId11"/>
   </p:sldIdLst>
   <p:sldSz cx="9144000" cy="6858000" type="screen4x3"/>
   <p:notesSz cx="6858000" cy="9144000"/>
@@ -3128,14 +3127,14 @@
           <a:bodyPr/>
           <a:p/>
           <a:p>
-            <a:pPr lvl="1"/>
-            <a:r>
-              <a:t>Title - Development of Red-Black Tree by Preeti</a:t>
+            <a:r>
+              <a:t>Title: The Development of Difference Between Containers and Virtual Machines</a:t>
             </a:r>
             <a:br/>
             <a:r>
-              <a:t>                                                                 </a:t>
-            </a:r>
+              <a:t>Presented By: Preeti  </a:t>
+            </a:r>
+            <a:br/>
             <a:br/>
           </a:p>
         </p:txBody>
@@ -3191,7 +3190,7 @@
           <a:lstStyle/>
           <a:p>
             <a:r>
-              <a:t>Slide 2: </a:t>
+              <a:t> Slide 2 : </a:t>
             </a:r>
           </a:p>
         </p:txBody>
@@ -3211,27 +3210,17 @@
           <a:bodyPr/>
           <a:p/>
           <a:p>
-            <a:pPr lvl="1"/>
-            <a:r>
-              <a:t>Introduction to Red-Black Trees </a:t>
+            <a:r>
+              <a:t>    Overview of Containers:</a:t>
             </a:r>
             <a:br/>
             <a:r>
-              <a:t>A red–black tree is a kind of self-balancing binary search tree which has the following general properties. </a:t>
+              <a:t>Container technology has been around since the early 2000's, with Google having originally developed it in 2008. A container runs on an operating system, like a virtual machine, but they do not require their own full operating system and are much smaller than VMs because they don't have to provision resources for separate OS isolations.  </a:t>
             </a:r>
             <a:br/>
             <a:r>
-              <a:t>• Every node has a color either red or black. </a:t>
-            </a:r>
-            <a:br/>
-            <a:r>
-              <a:t>• The root node is always black. </a:t>
-            </a:r>
-            <a:br/>
-            <a:r>
-              <a:t>• Every leaf (NIL) is black.   </a:t>
-            </a:r>
-            <a:br/>
+              <a:t> </a:t>
+            </a:r>
             <a:br/>
           </a:p>
         </p:txBody>
@@ -3287,7 +3276,7 @@
           <a:lstStyle/>
           <a:p>
             <a:r>
-              <a:t> Slides 3 and 4: Definitions and Properties of Red-Black Tree  	        	   	     	                                                                                                                              		        </a:t>
+              <a:t>Slide 3 :  Overview of Virtual Machines </a:t>
             </a:r>
           </a:p>
         </p:txBody>
@@ -3307,9 +3296,8 @@
           <a:bodyPr/>
           <a:p/>
           <a:p>
-            <a:pPr lvl="1"/>
-            <a:r>
-              <a:t>      • Every parent node should have two children – one red and another black. Each child of a parent must be distinct and either left or right child must be black while other can be either red, even if both are same color (could be two red). There should not any consecutive two nodes whose colors are same in the path from root to the node in question Shortest path consisting of consecutive blacks should have same number of blacks for all leaves – This means for every leaf there exists a path to it with same number of blacks. This helps define height(h) accurately</a:t>
+            <a:r>
+              <a:t>Virtual Machines or VMs are essentially isolation systems that recreate entire environments within an existing operating system. They allow users complete control over virtualized - computer hardware elements and software applications, meaning all your application requirements can be run in a secured environment isolated from all other processes on the server machine. Unlike containers, a VM needs to install another operating system completely independent from the host machine's operating system.  </a:t>
             </a:r>
             <a:br/>
             <a:br/>
@@ -3367,7 +3355,7 @@
           <a:lstStyle/>
           <a:p>
             <a:r>
-              <a:t>   Slide 5 : Operations on Red Black Tree     	                                                                                                                                                                              </a:t>
+              <a:t>     Slide 4 : Benefits of Containers vs Virtual Machines </a:t>
             </a:r>
           </a:p>
         </p:txBody>
@@ -3387,90 +3375,10 @@
           <a:bodyPr/>
           <a:p/>
           <a:p>
-            <a:pPr lvl="1"/>
-            <a:r>
-              <a:t>            • Insertion: To insert an element in the RBT, we need to locate its proper position with help of BST operations, then mark it as RED as per definition,. But this might violate rule 2 &amp; rule 3 stated above, so further adjust RBT using rotation and recoloring operations.  </a:t>
+            <a:r>
+              <a:t>Containers provide many advantages when compared to VMs including portability between environments such as cloud providers or internal networks later down the line; making them more cost-effective due to their low overhead instructions; faster boot times due to reduced size; as well as allowing automation which is paramount in agile Continuous Delivery (CD) pipelines. On the contrary, VMs offer much more stability thanks to increased isolation layer and security privileges even though installing multiple versions usually come with additional costs related to resources consumption.  </a:t>
             </a:r>
             <a:br/>
-            <a:br/>
-          </a:p>
-        </p:txBody>
-      </p:sp>
-      <p:sp>
-        <p:nvSpPr>
-          <p:cNvPr id="4" name="Text Placeholder 3"/>
-          <p:cNvSpPr>
-            <a:spLocks noGrp="1"/>
-          </p:cNvSpPr>
-          <p:nvPr>
-            <p:ph type="body" idx="2" sz="half"/>
-          </p:nvPr>
-        </p:nvSpPr>
-        <p:spPr/>
-        <p:txBody>
-          <a:bodyPr/>
-          <a:lstStyle/>
-          <a:p/>
-        </p:txBody>
-      </p:sp>
-    </p:spTree>
-  </p:cSld>
-  <p:clrMapOvr>
-    <a:masterClrMapping/>
-  </p:clrMapOvr>
-</p:sld>
-</file>
-
-<file path=ppt/slides/slide5.xml><?xml version="1.0" encoding="utf-8"?>
-<p:sld xmlns:a="http://schemas.openxmlformats.org/drawingml/2006/main" xmlns:p="http://schemas.openxmlformats.org/presentationml/2006/main" xmlns:r="http://schemas.openxmlformats.org/officeDocument/2006/relationships">
-  <p:cSld>
-    <p:spTree>
-      <p:nvGrpSpPr>
-        <p:cNvPr id="1" name=""/>
-        <p:cNvGrpSpPr/>
-        <p:nvPr/>
-      </p:nvGrpSpPr>
-      <p:grpSpPr/>
-      <p:sp>
-        <p:nvSpPr>
-          <p:cNvPr id="2" name="Title 1"/>
-          <p:cNvSpPr>
-            <a:spLocks noGrp="1"/>
-          </p:cNvSpPr>
-          <p:nvPr>
-            <p:ph type="title"/>
-          </p:nvPr>
-        </p:nvSpPr>
-        <p:spPr/>
-        <p:txBody>
-          <a:bodyPr/>
-          <a:lstStyle/>
-          <a:p>
-            <a:r>
-              <a:t> Slide 6: How Does Priority Queue Work?       	                                                                                                                            _x000D_               A priority queue is an abstract data type which is like a regular queue or stack data structure, but where additionally each elements has "priority" associated with it. With a priority queue elements can come off in any order depending on their priority high end first irrespective to when they are being added .The basic operations that can offerd by Priority Queues are Push , Top( also known as Head , Peek ) , Pop (also know as Dequeue ) .Moreover extended operation called Decrease Key that decreases the value associated with certain key may also supply .Heap sort algorithm uses Priority Queues along with Heaps .</a:t>
-            </a:r>
-          </a:p>
-        </p:txBody>
-      </p:sp>
-      <p:sp>
-        <p:nvSpPr>
-          <p:cNvPr id="3" name="Picture Placeholder 2"/>
-          <p:cNvSpPr>
-            <a:spLocks noGrp="1"/>
-          </p:cNvSpPr>
-          <p:nvPr>
-            <p:ph type="pic" idx="1"/>
-          </p:nvPr>
-        </p:nvSpPr>
-        <p:spPr/>
-        <p:txBody>
-          <a:bodyPr/>
-          <a:p/>
-          <a:p>
-            <a:pPr lvl="1"/>
-            <a:r>
-              <a:t>           </a:t>
-            </a:r>
             <a:br/>
           </a:p>
         </p:txBody>

</xml_diff>